<commit_message>
updated ttlight and tested new ttgrowth (v2)
</commit_message>
<xml_diff>
--- a/logo_ttalkr.pptx
+++ b/logo_ttalkr.pptx
@@ -105,15 +105,41 @@
       </a:defRPr>
     </a:lvl9pPr>
   </p:defaultTextStyle>
+  <p:extLst>
+    <p:ext uri="{EFAFB233-063F-42B5-8137-9DF3F51BA10A}">
+      <p15:sldGuideLst xmlns:p15="http://schemas.microsoft.com/office/powerpoint/2012/main"/>
+    </p:ext>
+  </p:extLst>
 </p:presentation>
 </file>
 
-<file path=ppt/revisionInfo.xml><?xml version="1.0" encoding="utf-8"?>
-<p1510:revInfo xmlns:a="http://schemas.openxmlformats.org/drawingml/2006/main" xmlns:r="http://schemas.openxmlformats.org/officeDocument/2006/relationships" xmlns:p1510="http://schemas.microsoft.com/office/powerpoint/2015/10/main">
-  <p1510:revLst>
-    <p1510:client id="{627F97C4-95CD-BA4F-9D13-AB04B77363C3}" v="15" dt="2021-03-16T10:02:49.527"/>
-  </p1510:revLst>
-</p1510:revInfo>
+<file path=ppt/changesInfos/changesInfo1.xml><?xml version="1.0" encoding="utf-8"?>
+<pc:chgInfo xmlns:a="http://schemas.openxmlformats.org/drawingml/2006/main" xmlns:r="http://schemas.openxmlformats.org/officeDocument/2006/relationships" xmlns:ac="http://schemas.microsoft.com/office/drawing/2013/main/command" xmlns:pc="http://schemas.microsoft.com/office/powerpoint/2013/main/command">
+  <pc:docChgLst>
+    <pc:chgData name="Tomelleri Enrico" userId="024ed94a-5a78-4e35-b9a0-20d7f458abcb" providerId="ADAL" clId="{F666AC40-180D-4340-BE09-E5BE10AE23D3}"/>
+    <pc:docChg chg="modSld">
+      <pc:chgData name="Tomelleri Enrico" userId="024ed94a-5a78-4e35-b9a0-20d7f458abcb" providerId="ADAL" clId="{F666AC40-180D-4340-BE09-E5BE10AE23D3}" dt="2021-04-15T17:46:23.127" v="0" actId="164"/>
+      <pc:docMkLst>
+        <pc:docMk/>
+      </pc:docMkLst>
+      <pc:sldChg chg="addSp mod">
+        <pc:chgData name="Tomelleri Enrico" userId="024ed94a-5a78-4e35-b9a0-20d7f458abcb" providerId="ADAL" clId="{F666AC40-180D-4340-BE09-E5BE10AE23D3}" dt="2021-04-15T17:46:23.127" v="0" actId="164"/>
+        <pc:sldMkLst>
+          <pc:docMk/>
+          <pc:sldMk cId="1481544101" sldId="256"/>
+        </pc:sldMkLst>
+        <pc:grpChg chg="add">
+          <ac:chgData name="Tomelleri Enrico" userId="024ed94a-5a78-4e35-b9a0-20d7f458abcb" providerId="ADAL" clId="{F666AC40-180D-4340-BE09-E5BE10AE23D3}" dt="2021-04-15T17:46:23.127" v="0" actId="164"/>
+          <ac:grpSpMkLst>
+            <pc:docMk/>
+            <pc:sldMk cId="1481544101" sldId="256"/>
+            <ac:grpSpMk id="2" creationId="{7C1509FF-C182-424D-895C-47459F6E62CA}"/>
+          </ac:grpSpMkLst>
+        </pc:grpChg>
+      </pc:sldChg>
+    </pc:docChg>
+  </pc:docChgLst>
+</pc:chgInfo>
 </file>
 
 <file path=ppt/slideLayouts/slideLayout1.xml><?xml version="1.0" encoding="utf-8"?>
@@ -265,7 +291,7 @@
           <a:p>
             <a:fld id="{FBD303A9-7B10-2940-9085-F6AE4A843D66}" type="datetimeFigureOut">
               <a:rPr lang="en-GB" smtClean="0"/>
-              <a:t>16/03/2021</a:t>
+              <a:t>15/04/2021</a:t>
             </a:fld>
             <a:endParaRPr lang="en-GB"/>
           </a:p>
@@ -465,7 +491,7 @@
           <a:p>
             <a:fld id="{FBD303A9-7B10-2940-9085-F6AE4A843D66}" type="datetimeFigureOut">
               <a:rPr lang="en-GB" smtClean="0"/>
-              <a:t>16/03/2021</a:t>
+              <a:t>15/04/2021</a:t>
             </a:fld>
             <a:endParaRPr lang="en-GB"/>
           </a:p>
@@ -675,7 +701,7 @@
           <a:p>
             <a:fld id="{FBD303A9-7B10-2940-9085-F6AE4A843D66}" type="datetimeFigureOut">
               <a:rPr lang="en-GB" smtClean="0"/>
-              <a:t>16/03/2021</a:t>
+              <a:t>15/04/2021</a:t>
             </a:fld>
             <a:endParaRPr lang="en-GB"/>
           </a:p>
@@ -875,7 +901,7 @@
           <a:p>
             <a:fld id="{FBD303A9-7B10-2940-9085-F6AE4A843D66}" type="datetimeFigureOut">
               <a:rPr lang="en-GB" smtClean="0"/>
-              <a:t>16/03/2021</a:t>
+              <a:t>15/04/2021</a:t>
             </a:fld>
             <a:endParaRPr lang="en-GB"/>
           </a:p>
@@ -1151,7 +1177,7 @@
           <a:p>
             <a:fld id="{FBD303A9-7B10-2940-9085-F6AE4A843D66}" type="datetimeFigureOut">
               <a:rPr lang="en-GB" smtClean="0"/>
-              <a:t>16/03/2021</a:t>
+              <a:t>15/04/2021</a:t>
             </a:fld>
             <a:endParaRPr lang="en-GB"/>
           </a:p>
@@ -1419,7 +1445,7 @@
           <a:p>
             <a:fld id="{FBD303A9-7B10-2940-9085-F6AE4A843D66}" type="datetimeFigureOut">
               <a:rPr lang="en-GB" smtClean="0"/>
-              <a:t>16/03/2021</a:t>
+              <a:t>15/04/2021</a:t>
             </a:fld>
             <a:endParaRPr lang="en-GB"/>
           </a:p>
@@ -1834,7 +1860,7 @@
           <a:p>
             <a:fld id="{FBD303A9-7B10-2940-9085-F6AE4A843D66}" type="datetimeFigureOut">
               <a:rPr lang="en-GB" smtClean="0"/>
-              <a:t>16/03/2021</a:t>
+              <a:t>15/04/2021</a:t>
             </a:fld>
             <a:endParaRPr lang="en-GB"/>
           </a:p>
@@ -1976,7 +2002,7 @@
           <a:p>
             <a:fld id="{FBD303A9-7B10-2940-9085-F6AE4A843D66}" type="datetimeFigureOut">
               <a:rPr lang="en-GB" smtClean="0"/>
-              <a:t>16/03/2021</a:t>
+              <a:t>15/04/2021</a:t>
             </a:fld>
             <a:endParaRPr lang="en-GB"/>
           </a:p>
@@ -2089,7 +2115,7 @@
           <a:p>
             <a:fld id="{FBD303A9-7B10-2940-9085-F6AE4A843D66}" type="datetimeFigureOut">
               <a:rPr lang="en-GB" smtClean="0"/>
-              <a:t>16/03/2021</a:t>
+              <a:t>15/04/2021</a:t>
             </a:fld>
             <a:endParaRPr lang="en-GB"/>
           </a:p>
@@ -2402,7 +2428,7 @@
           <a:p>
             <a:fld id="{FBD303A9-7B10-2940-9085-F6AE4A843D66}" type="datetimeFigureOut">
               <a:rPr lang="en-GB" smtClean="0"/>
-              <a:t>16/03/2021</a:t>
+              <a:t>15/04/2021</a:t>
             </a:fld>
             <a:endParaRPr lang="en-GB"/>
           </a:p>
@@ -2691,7 +2717,7 @@
           <a:p>
             <a:fld id="{FBD303A9-7B10-2940-9085-F6AE4A843D66}" type="datetimeFigureOut">
               <a:rPr lang="en-GB" smtClean="0"/>
-              <a:t>16/03/2021</a:t>
+              <a:t>15/04/2021</a:t>
             </a:fld>
             <a:endParaRPr lang="en-GB"/>
           </a:p>
@@ -2934,7 +2960,7 @@
           <a:p>
             <a:fld id="{FBD303A9-7B10-2940-9085-F6AE4A843D66}" type="datetimeFigureOut">
               <a:rPr lang="en-GB" smtClean="0"/>
-              <a:t>16/03/2021</a:t>
+              <a:t>15/04/2021</a:t>
             </a:fld>
             <a:endParaRPr lang="en-GB"/>
           </a:p>
@@ -3353,10 +3379,10 @@
       </p:grpSpPr>
       <p:grpSp>
         <p:nvGrpSpPr>
-          <p:cNvPr id="8" name="Gruppieren 7">
-            <a:extLst>
-              <a:ext uri="{FF2B5EF4-FFF2-40B4-BE49-F238E27FC236}">
-                <a16:creationId xmlns:a16="http://schemas.microsoft.com/office/drawing/2014/main" id="{ABB3549E-B358-7B46-BE31-B43EDA106F99}"/>
+          <p:cNvPr id="2" name="Gruppieren 1">
+            <a:extLst>
+              <a:ext uri="{FF2B5EF4-FFF2-40B4-BE49-F238E27FC236}">
+                <a16:creationId xmlns:a16="http://schemas.microsoft.com/office/drawing/2014/main" id="{7C1509FF-C182-424D-895C-47459F6E62CA}"/>
               </a:ext>
             </a:extLst>
           </p:cNvPr>
@@ -3367,16 +3393,172 @@
           <a:xfrm>
             <a:off x="2640245" y="1518243"/>
             <a:ext cx="3014133" cy="3285066"/>
-            <a:chOff x="4639733" y="1134534"/>
+            <a:chOff x="2640245" y="1518243"/>
             <a:chExt cx="3014133" cy="3285066"/>
           </a:xfrm>
         </p:grpSpPr>
+        <p:grpSp>
+          <p:nvGrpSpPr>
+            <p:cNvPr id="8" name="Gruppieren 7">
+              <a:extLst>
+                <a:ext uri="{FF2B5EF4-FFF2-40B4-BE49-F238E27FC236}">
+                  <a16:creationId xmlns:a16="http://schemas.microsoft.com/office/drawing/2014/main" id="{ABB3549E-B358-7B46-BE31-B43EDA106F99}"/>
+                </a:ext>
+              </a:extLst>
+            </p:cNvPr>
+            <p:cNvGrpSpPr/>
+            <p:nvPr/>
+          </p:nvGrpSpPr>
+          <p:grpSpPr>
+            <a:xfrm>
+              <a:off x="2640245" y="1518243"/>
+              <a:ext cx="3014133" cy="3285066"/>
+              <a:chOff x="4639733" y="1134534"/>
+              <a:chExt cx="3014133" cy="3285066"/>
+            </a:xfrm>
+          </p:grpSpPr>
+          <p:sp>
+            <p:nvSpPr>
+              <p:cNvPr id="4" name="Sechseck 3">
+                <a:extLst>
+                  <a:ext uri="{FF2B5EF4-FFF2-40B4-BE49-F238E27FC236}">
+                    <a16:creationId xmlns:a16="http://schemas.microsoft.com/office/drawing/2014/main" id="{9D824FD6-39FD-9247-9097-9BA0C41397C1}"/>
+                  </a:ext>
+                </a:extLst>
+              </p:cNvPr>
+              <p:cNvSpPr/>
+              <p:nvPr/>
+            </p:nvSpPr>
+            <p:spPr>
+              <a:xfrm rot="16200000">
+                <a:off x="4504267" y="1270000"/>
+                <a:ext cx="3285066" cy="3014133"/>
+              </a:xfrm>
+              <a:prstGeom prst="hexagon">
+                <a:avLst/>
+              </a:prstGeom>
+              <a:solidFill>
+                <a:schemeClr val="tx1"/>
+              </a:solidFill>
+              <a:ln w="76200">
+                <a:solidFill>
+                  <a:srgbClr val="2C9C8D"/>
+                </a:solidFill>
+              </a:ln>
+            </p:spPr>
+            <p:style>
+              <a:lnRef idx="2">
+                <a:schemeClr val="accent1">
+                  <a:shade val="50000"/>
+                </a:schemeClr>
+              </a:lnRef>
+              <a:fillRef idx="1">
+                <a:schemeClr val="accent1"/>
+              </a:fillRef>
+              <a:effectRef idx="0">
+                <a:schemeClr val="accent1"/>
+              </a:effectRef>
+              <a:fontRef idx="minor">
+                <a:schemeClr val="lt1"/>
+              </a:fontRef>
+            </p:style>
+            <p:txBody>
+              <a:bodyPr rtlCol="0" anchor="ctr"/>
+              <a:lstStyle/>
+              <a:p>
+                <a:pPr algn="ctr"/>
+                <a:endParaRPr lang="en-GB">
+                  <a:solidFill>
+                    <a:schemeClr val="tx1"/>
+                  </a:solidFill>
+                </a:endParaRPr>
+              </a:p>
+            </p:txBody>
+          </p:sp>
+          <p:pic>
+            <p:nvPicPr>
+              <p:cNvPr id="6" name="Grafik 5" descr="Ein Bild, das Text enthält.&#10;&#10;Automatisch generierte Beschreibung">
+                <a:extLst>
+                  <a:ext uri="{FF2B5EF4-FFF2-40B4-BE49-F238E27FC236}">
+                    <a16:creationId xmlns:a16="http://schemas.microsoft.com/office/drawing/2014/main" id="{E3ACEC2D-A3C9-2645-A652-3FDB5F668939}"/>
+                  </a:ext>
+                </a:extLst>
+              </p:cNvPr>
+              <p:cNvPicPr>
+                <a:picLocks noChangeAspect="1"/>
+              </p:cNvPicPr>
+              <p:nvPr/>
+            </p:nvPicPr>
+            <p:blipFill rotWithShape="1">
+              <a:blip r:embed="rId2"/>
+              <a:srcRect l="7002" t="48473" r="72761" b="10437"/>
+              <a:stretch/>
+            </p:blipFill>
+            <p:spPr>
+              <a:xfrm>
+                <a:off x="5384132" y="1602232"/>
+                <a:ext cx="1568287" cy="1722120"/>
+              </a:xfrm>
+              <a:prstGeom prst="rect">
+                <a:avLst/>
+              </a:prstGeom>
+            </p:spPr>
+          </p:pic>
+          <p:sp>
+            <p:nvSpPr>
+              <p:cNvPr id="7" name="Textfeld 6">
+                <a:extLst>
+                  <a:ext uri="{FF2B5EF4-FFF2-40B4-BE49-F238E27FC236}">
+                    <a16:creationId xmlns:a16="http://schemas.microsoft.com/office/drawing/2014/main" id="{E2060DF6-C621-6E49-9485-184448250236}"/>
+                  </a:ext>
+                </a:extLst>
+              </p:cNvPr>
+              <p:cNvSpPr txBox="1"/>
+              <p:nvPr/>
+            </p:nvSpPr>
+            <p:spPr>
+              <a:xfrm>
+                <a:off x="5196840" y="3244883"/>
+                <a:ext cx="2017776" cy="830997"/>
+              </a:xfrm>
+              <a:prstGeom prst="rect">
+                <a:avLst/>
+              </a:prstGeom>
+              <a:noFill/>
+            </p:spPr>
+            <p:txBody>
+              <a:bodyPr wrap="square" rtlCol="0">
+                <a:spAutoFit/>
+              </a:bodyPr>
+              <a:lstStyle/>
+              <a:p>
+                <a:r>
+                  <a:rPr lang="en-GB" sz="4800" noProof="1">
+                    <a:solidFill>
+                      <a:srgbClr val="2C9C8D"/>
+                    </a:solidFill>
+                    <a:latin typeface="Hadassah Friedlaender" panose="020F0502020204030204" pitchFamily="34" charset="0"/>
+                    <a:cs typeface="Hadassah Friedlaender" panose="020F0502020204030204" pitchFamily="34" charset="0"/>
+                  </a:rPr>
+                  <a:t>ttalkR</a:t>
+                </a:r>
+                <a:endParaRPr lang="en-GB" sz="2400" noProof="1">
+                  <a:solidFill>
+                    <a:srgbClr val="2C9C8D"/>
+                  </a:solidFill>
+                  <a:latin typeface="Hadassah Friedlaender" panose="020F0502020204030204" pitchFamily="34" charset="0"/>
+                  <a:cs typeface="Hadassah Friedlaender" panose="020F0502020204030204" pitchFamily="34" charset="0"/>
+                </a:endParaRPr>
+              </a:p>
+            </p:txBody>
+          </p:sp>
+        </p:grpSp>
         <p:sp>
           <p:nvSpPr>
-            <p:cNvPr id="4" name="Sechseck 3">
+            <p:cNvPr id="9" name="Oval 8">
               <a:extLst>
                 <a:ext uri="{FF2B5EF4-FFF2-40B4-BE49-F238E27FC236}">
-                  <a16:creationId xmlns:a16="http://schemas.microsoft.com/office/drawing/2014/main" id="{9D824FD6-39FD-9247-9097-9BA0C41397C1}"/>
+                  <a16:creationId xmlns:a16="http://schemas.microsoft.com/office/drawing/2014/main" id="{7268C5CD-F27A-A64E-A578-7497F496A590}"/>
                 </a:ext>
               </a:extLst>
             </p:cNvPr>
@@ -3384,16 +3566,14 @@
             <p:nvPr/>
           </p:nvSpPr>
           <p:spPr>
-            <a:xfrm rot="16200000">
-              <a:off x="4504267" y="1270000"/>
-              <a:ext cx="3285066" cy="3014133"/>
+            <a:xfrm>
+              <a:off x="3359189" y="2094931"/>
+              <a:ext cx="1519886" cy="1533661"/>
             </a:xfrm>
-            <a:prstGeom prst="hexagon">
+            <a:prstGeom prst="ellipse">
               <a:avLst/>
             </a:prstGeom>
-            <a:solidFill>
-              <a:schemeClr val="tx1"/>
-            </a:solidFill>
+            <a:noFill/>
             <a:ln w="76200">
               <a:solidFill>
                 <a:srgbClr val="2C9C8D"/>
@@ -3421,144 +3601,11 @@
             <a:lstStyle/>
             <a:p>
               <a:pPr algn="ctr"/>
-              <a:endParaRPr lang="en-GB">
-                <a:solidFill>
-                  <a:schemeClr val="tx1"/>
-                </a:solidFill>
-              </a:endParaRPr>
-            </a:p>
-          </p:txBody>
-        </p:sp>
-        <p:pic>
-          <p:nvPicPr>
-            <p:cNvPr id="6" name="Grafik 5" descr="Ein Bild, das Text enthält.&#10;&#10;Automatisch generierte Beschreibung">
-              <a:extLst>
-                <a:ext uri="{FF2B5EF4-FFF2-40B4-BE49-F238E27FC236}">
-                  <a16:creationId xmlns:a16="http://schemas.microsoft.com/office/drawing/2014/main" id="{E3ACEC2D-A3C9-2645-A652-3FDB5F668939}"/>
-                </a:ext>
-              </a:extLst>
-            </p:cNvPr>
-            <p:cNvPicPr>
-              <a:picLocks noChangeAspect="1"/>
-            </p:cNvPicPr>
-            <p:nvPr/>
-          </p:nvPicPr>
-          <p:blipFill rotWithShape="1">
-            <a:blip r:embed="rId2"/>
-            <a:srcRect l="7002" t="48473" r="72761" b="10437"/>
-            <a:stretch/>
-          </p:blipFill>
-          <p:spPr>
-            <a:xfrm>
-              <a:off x="5384132" y="1602232"/>
-              <a:ext cx="1568287" cy="1722120"/>
-            </a:xfrm>
-            <a:prstGeom prst="rect">
-              <a:avLst/>
-            </a:prstGeom>
-          </p:spPr>
-        </p:pic>
-        <p:sp>
-          <p:nvSpPr>
-            <p:cNvPr id="7" name="Textfeld 6">
-              <a:extLst>
-                <a:ext uri="{FF2B5EF4-FFF2-40B4-BE49-F238E27FC236}">
-                  <a16:creationId xmlns:a16="http://schemas.microsoft.com/office/drawing/2014/main" id="{E2060DF6-C621-6E49-9485-184448250236}"/>
-                </a:ext>
-              </a:extLst>
-            </p:cNvPr>
-            <p:cNvSpPr txBox="1"/>
-            <p:nvPr/>
-          </p:nvSpPr>
-          <p:spPr>
-            <a:xfrm>
-              <a:off x="5196840" y="3244883"/>
-              <a:ext cx="2017776" cy="830997"/>
-            </a:xfrm>
-            <a:prstGeom prst="rect">
-              <a:avLst/>
-            </a:prstGeom>
-            <a:noFill/>
-          </p:spPr>
-          <p:txBody>
-            <a:bodyPr wrap="square" rtlCol="0">
-              <a:spAutoFit/>
-            </a:bodyPr>
-            <a:lstStyle/>
-            <a:p>
-              <a:r>
-                <a:rPr lang="en-GB" sz="4800" noProof="1">
-                  <a:solidFill>
-                    <a:srgbClr val="2C9C8D"/>
-                  </a:solidFill>
-                  <a:latin typeface="Hadassah Friedlaender" panose="020F0502020204030204" pitchFamily="34" charset="0"/>
-                  <a:cs typeface="Hadassah Friedlaender" panose="020F0502020204030204" pitchFamily="34" charset="0"/>
-                </a:rPr>
-                <a:t>ttalkR</a:t>
-              </a:r>
-              <a:endParaRPr lang="en-GB" sz="2400" noProof="1">
-                <a:solidFill>
-                  <a:srgbClr val="2C9C8D"/>
-                </a:solidFill>
-                <a:latin typeface="Hadassah Friedlaender" panose="020F0502020204030204" pitchFamily="34" charset="0"/>
-                <a:cs typeface="Hadassah Friedlaender" panose="020F0502020204030204" pitchFamily="34" charset="0"/>
-              </a:endParaRPr>
+              <a:endParaRPr lang="en-GB"/>
             </a:p>
           </p:txBody>
         </p:sp>
       </p:grpSp>
-      <p:sp>
-        <p:nvSpPr>
-          <p:cNvPr id="9" name="Oval 8">
-            <a:extLst>
-              <a:ext uri="{FF2B5EF4-FFF2-40B4-BE49-F238E27FC236}">
-                <a16:creationId xmlns:a16="http://schemas.microsoft.com/office/drawing/2014/main" id="{7268C5CD-F27A-A64E-A578-7497F496A590}"/>
-              </a:ext>
-            </a:extLst>
-          </p:cNvPr>
-          <p:cNvSpPr/>
-          <p:nvPr/>
-        </p:nvSpPr>
-        <p:spPr>
-          <a:xfrm>
-            <a:off x="3359189" y="2094931"/>
-            <a:ext cx="1519886" cy="1533661"/>
-          </a:xfrm>
-          <a:prstGeom prst="ellipse">
-            <a:avLst/>
-          </a:prstGeom>
-          <a:noFill/>
-          <a:ln w="76200">
-            <a:solidFill>
-              <a:srgbClr val="2C9C8D"/>
-            </a:solidFill>
-          </a:ln>
-        </p:spPr>
-        <p:style>
-          <a:lnRef idx="2">
-            <a:schemeClr val="accent1">
-              <a:shade val="50000"/>
-            </a:schemeClr>
-          </a:lnRef>
-          <a:fillRef idx="1">
-            <a:schemeClr val="accent1"/>
-          </a:fillRef>
-          <a:effectRef idx="0">
-            <a:schemeClr val="accent1"/>
-          </a:effectRef>
-          <a:fontRef idx="minor">
-            <a:schemeClr val="lt1"/>
-          </a:fontRef>
-        </p:style>
-        <p:txBody>
-          <a:bodyPr rtlCol="0" anchor="ctr"/>
-          <a:lstStyle/>
-          <a:p>
-            <a:pPr algn="ctr"/>
-            <a:endParaRPr lang="en-GB"/>
-          </a:p>
-        </p:txBody>
-      </p:sp>
     </p:spTree>
     <p:extLst>
       <p:ext uri="{BB962C8B-B14F-4D97-AF65-F5344CB8AC3E}">

</xml_diff>

<commit_message>
possibility of subsetting introduced
subsetting the time series should help to speed up plotting on slow machines
</commit_message>
<xml_diff>
--- a/logo_ttalkr.pptx
+++ b/logo_ttalkr.pptx
@@ -127,7 +127,7 @@
   <pc:docChgLst>
     <pc:chgData name="Tomelleri Enrico" userId="024ed94a-5a78-4e35-b9a0-20d7f458abcb" providerId="ADAL" clId="{59DA42F6-32AA-D243-B315-C41DD94FB2BB}"/>
     <pc:docChg chg="undo custSel addSld delSld modSld">
-      <pc:chgData name="Tomelleri Enrico" userId="024ed94a-5a78-4e35-b9a0-20d7f458abcb" providerId="ADAL" clId="{59DA42F6-32AA-D243-B315-C41DD94FB2BB}" dt="2021-05-12T12:36:21.264" v="254" actId="1076"/>
+      <pc:chgData name="Tomelleri Enrico" userId="024ed94a-5a78-4e35-b9a0-20d7f458abcb" providerId="ADAL" clId="{59DA42F6-32AA-D243-B315-C41DD94FB2BB}" dt="2021-06-03T08:02:31.224" v="262" actId="207"/>
       <pc:docMkLst>
         <pc:docMk/>
       </pc:docMkLst>
@@ -209,7 +209,7 @@
         </pc:picChg>
       </pc:sldChg>
       <pc:sldChg chg="addSp delSp modSp new mod">
-        <pc:chgData name="Tomelleri Enrico" userId="024ed94a-5a78-4e35-b9a0-20d7f458abcb" providerId="ADAL" clId="{59DA42F6-32AA-D243-B315-C41DD94FB2BB}" dt="2021-05-12T12:36:21.264" v="254" actId="1076"/>
+        <pc:chgData name="Tomelleri Enrico" userId="024ed94a-5a78-4e35-b9a0-20d7f458abcb" providerId="ADAL" clId="{59DA42F6-32AA-D243-B315-C41DD94FB2BB}" dt="2021-06-03T08:02:31.224" v="262" actId="207"/>
         <pc:sldMkLst>
           <pc:docMk/>
           <pc:sldMk cId="2867756989" sldId="258"/>
@@ -247,7 +247,7 @@
           </ac:spMkLst>
         </pc:spChg>
         <pc:spChg chg="add mod">
-          <ac:chgData name="Tomelleri Enrico" userId="024ed94a-5a78-4e35-b9a0-20d7f458abcb" providerId="ADAL" clId="{59DA42F6-32AA-D243-B315-C41DD94FB2BB}" dt="2021-05-12T12:36:00.280" v="249" actId="1076"/>
+          <ac:chgData name="Tomelleri Enrico" userId="024ed94a-5a78-4e35-b9a0-20d7f458abcb" providerId="ADAL" clId="{59DA42F6-32AA-D243-B315-C41DD94FB2BB}" dt="2021-06-03T08:02:07.237" v="256" actId="20577"/>
           <ac:spMkLst>
             <pc:docMk/>
             <pc:sldMk cId="2867756989" sldId="258"/>
@@ -255,7 +255,7 @@
           </ac:spMkLst>
         </pc:spChg>
         <pc:spChg chg="add mod">
-          <ac:chgData name="Tomelleri Enrico" userId="024ed94a-5a78-4e35-b9a0-20d7f458abcb" providerId="ADAL" clId="{59DA42F6-32AA-D243-B315-C41DD94FB2BB}" dt="2021-05-12T12:36:08.057" v="252" actId="1076"/>
+          <ac:chgData name="Tomelleri Enrico" userId="024ed94a-5a78-4e35-b9a0-20d7f458abcb" providerId="ADAL" clId="{59DA42F6-32AA-D243-B315-C41DD94FB2BB}" dt="2021-06-03T08:02:31.224" v="262" actId="207"/>
           <ac:spMkLst>
             <pc:docMk/>
             <pc:sldMk cId="2867756989" sldId="258"/>
@@ -271,7 +271,7 @@
           </ac:spMkLst>
         </pc:spChg>
         <pc:spChg chg="add mod">
-          <ac:chgData name="Tomelleri Enrico" userId="024ed94a-5a78-4e35-b9a0-20d7f458abcb" providerId="ADAL" clId="{59DA42F6-32AA-D243-B315-C41DD94FB2BB}" dt="2021-05-12T12:36:11.276" v="253" actId="1076"/>
+          <ac:chgData name="Tomelleri Enrico" userId="024ed94a-5a78-4e35-b9a0-20d7f458abcb" providerId="ADAL" clId="{59DA42F6-32AA-D243-B315-C41DD94FB2BB}" dt="2021-06-03T08:02:27.686" v="261" actId="207"/>
           <ac:spMkLst>
             <pc:docMk/>
             <pc:sldMk cId="2867756989" sldId="258"/>
@@ -295,7 +295,7 @@
           </ac:spMkLst>
         </pc:spChg>
         <pc:spChg chg="add mod">
-          <ac:chgData name="Tomelleri Enrico" userId="024ed94a-5a78-4e35-b9a0-20d7f458abcb" providerId="ADAL" clId="{59DA42F6-32AA-D243-B315-C41DD94FB2BB}" dt="2021-05-12T12:36:21.264" v="254" actId="1076"/>
+          <ac:chgData name="Tomelleri Enrico" userId="024ed94a-5a78-4e35-b9a0-20d7f458abcb" providerId="ADAL" clId="{59DA42F6-32AA-D243-B315-C41DD94FB2BB}" dt="2021-06-03T08:02:15.109" v="258" actId="20577"/>
           <ac:spMkLst>
             <pc:docMk/>
             <pc:sldMk cId="2867756989" sldId="258"/>
@@ -489,7 +489,7 @@
           <a:p>
             <a:fld id="{FBD303A9-7B10-2940-9085-F6AE4A843D66}" type="datetimeFigureOut">
               <a:rPr lang="en-GB" smtClean="0"/>
-              <a:t>12/05/2021</a:t>
+              <a:t>03/06/2021</a:t>
             </a:fld>
             <a:endParaRPr lang="en-GB"/>
           </a:p>
@@ -689,7 +689,7 @@
           <a:p>
             <a:fld id="{FBD303A9-7B10-2940-9085-F6AE4A843D66}" type="datetimeFigureOut">
               <a:rPr lang="en-GB" smtClean="0"/>
-              <a:t>12/05/2021</a:t>
+              <a:t>03/06/2021</a:t>
             </a:fld>
             <a:endParaRPr lang="en-GB"/>
           </a:p>
@@ -899,7 +899,7 @@
           <a:p>
             <a:fld id="{FBD303A9-7B10-2940-9085-F6AE4A843D66}" type="datetimeFigureOut">
               <a:rPr lang="en-GB" smtClean="0"/>
-              <a:t>12/05/2021</a:t>
+              <a:t>03/06/2021</a:t>
             </a:fld>
             <a:endParaRPr lang="en-GB"/>
           </a:p>
@@ -1099,7 +1099,7 @@
           <a:p>
             <a:fld id="{FBD303A9-7B10-2940-9085-F6AE4A843D66}" type="datetimeFigureOut">
               <a:rPr lang="en-GB" smtClean="0"/>
-              <a:t>12/05/2021</a:t>
+              <a:t>03/06/2021</a:t>
             </a:fld>
             <a:endParaRPr lang="en-GB"/>
           </a:p>
@@ -1375,7 +1375,7 @@
           <a:p>
             <a:fld id="{FBD303A9-7B10-2940-9085-F6AE4A843D66}" type="datetimeFigureOut">
               <a:rPr lang="en-GB" smtClean="0"/>
-              <a:t>12/05/2021</a:t>
+              <a:t>03/06/2021</a:t>
             </a:fld>
             <a:endParaRPr lang="en-GB"/>
           </a:p>
@@ -1643,7 +1643,7 @@
           <a:p>
             <a:fld id="{FBD303A9-7B10-2940-9085-F6AE4A843D66}" type="datetimeFigureOut">
               <a:rPr lang="en-GB" smtClean="0"/>
-              <a:t>12/05/2021</a:t>
+              <a:t>03/06/2021</a:t>
             </a:fld>
             <a:endParaRPr lang="en-GB"/>
           </a:p>
@@ -2058,7 +2058,7 @@
           <a:p>
             <a:fld id="{FBD303A9-7B10-2940-9085-F6AE4A843D66}" type="datetimeFigureOut">
               <a:rPr lang="en-GB" smtClean="0"/>
-              <a:t>12/05/2021</a:t>
+              <a:t>03/06/2021</a:t>
             </a:fld>
             <a:endParaRPr lang="en-GB"/>
           </a:p>
@@ -2200,7 +2200,7 @@
           <a:p>
             <a:fld id="{FBD303A9-7B10-2940-9085-F6AE4A843D66}" type="datetimeFigureOut">
               <a:rPr lang="en-GB" smtClean="0"/>
-              <a:t>12/05/2021</a:t>
+              <a:t>03/06/2021</a:t>
             </a:fld>
             <a:endParaRPr lang="en-GB"/>
           </a:p>
@@ -2313,7 +2313,7 @@
           <a:p>
             <a:fld id="{FBD303A9-7B10-2940-9085-F6AE4A843D66}" type="datetimeFigureOut">
               <a:rPr lang="en-GB" smtClean="0"/>
-              <a:t>12/05/2021</a:t>
+              <a:t>03/06/2021</a:t>
             </a:fld>
             <a:endParaRPr lang="en-GB"/>
           </a:p>
@@ -2626,7 +2626,7 @@
           <a:p>
             <a:fld id="{FBD303A9-7B10-2940-9085-F6AE4A843D66}" type="datetimeFigureOut">
               <a:rPr lang="en-GB" smtClean="0"/>
-              <a:t>12/05/2021</a:t>
+              <a:t>03/06/2021</a:t>
             </a:fld>
             <a:endParaRPr lang="en-GB"/>
           </a:p>
@@ -2915,7 +2915,7 @@
           <a:p>
             <a:fld id="{FBD303A9-7B10-2940-9085-F6AE4A843D66}" type="datetimeFigureOut">
               <a:rPr lang="en-GB" smtClean="0"/>
-              <a:t>12/05/2021</a:t>
+              <a:t>03/06/2021</a:t>
             </a:fld>
             <a:endParaRPr lang="en-GB"/>
           </a:p>
@@ -3158,7 +3158,7 @@
           <a:p>
             <a:fld id="{FBD303A9-7B10-2940-9085-F6AE4A843D66}" type="datetimeFigureOut">
               <a:rPr lang="en-GB" smtClean="0"/>
-              <a:t>12/05/2021</a:t>
+              <a:t>03/06/2021</a:t>
             </a:fld>
             <a:endParaRPr lang="en-GB"/>
           </a:p>
@@ -4073,7 +4073,7 @@
             <a:avLst/>
           </a:prstGeom>
           <a:solidFill>
-            <a:srgbClr val="FFC000"/>
+            <a:srgbClr val="00B050"/>
           </a:solidFill>
         </p:spPr>
         <p:style>
@@ -4106,20 +4106,6 @@
               <a:t>()</a:t>
             </a:r>
           </a:p>
-          <a:p>
-            <a:pPr algn="ctr"/>
-            <a:r>
-              <a:rPr lang="en-GB" sz="1600" dirty="0">
-                <a:solidFill>
-                  <a:schemeClr val="tx1">
-                    <a:lumMod val="95000"/>
-                    <a:lumOff val="5000"/>
-                  </a:schemeClr>
-                </a:solidFill>
-              </a:rPr>
-              <a:t>Missing: plotting utility</a:t>
-            </a:r>
-          </a:p>
         </p:txBody>
       </p:sp>
       <p:sp>
@@ -4143,7 +4129,7 @@
             <a:avLst/>
           </a:prstGeom>
           <a:solidFill>
-            <a:srgbClr val="FFC000"/>
+            <a:srgbClr val="00B050"/>
           </a:solidFill>
         </p:spPr>
         <p:style>
@@ -4269,7 +4255,7 @@
             <a:avLst/>
           </a:prstGeom>
           <a:solidFill>
-            <a:srgbClr val="FF0000"/>
+            <a:srgbClr val="FFC000"/>
           </a:solidFill>
         </p:spPr>
         <p:style>
@@ -4300,20 +4286,6 @@
             <a:r>
               <a:rPr lang="en-GB" sz="2800" dirty="0"/>
               <a:t>()</a:t>
-            </a:r>
-          </a:p>
-          <a:p>
-            <a:pPr algn="ctr"/>
-            <a:r>
-              <a:rPr lang="en-GB" sz="1600" dirty="0">
-                <a:solidFill>
-                  <a:schemeClr val="tx1">
-                    <a:lumMod val="95000"/>
-                    <a:lumOff val="5000"/>
-                  </a:schemeClr>
-                </a:solidFill>
-              </a:rPr>
-              <a:t>Missing: data filtering, plotting utility</a:t>
             </a:r>
           </a:p>
         </p:txBody>
@@ -4484,7 +4456,7 @@
             <a:avLst/>
           </a:prstGeom>
           <a:solidFill>
-            <a:srgbClr val="FF0000"/>
+            <a:srgbClr val="00B050"/>
           </a:solidFill>
         </p:spPr>
         <p:style>
@@ -4515,20 +4487,6 @@
             <a:r>
               <a:rPr lang="en-GB" sz="2800" dirty="0"/>
               <a:t>()</a:t>
-            </a:r>
-          </a:p>
-          <a:p>
-            <a:pPr algn="ctr"/>
-            <a:r>
-              <a:rPr lang="en-GB" sz="1600" dirty="0">
-                <a:solidFill>
-                  <a:schemeClr val="tx1">
-                    <a:lumMod val="95000"/>
-                    <a:lumOff val="5000"/>
-                  </a:schemeClr>
-                </a:solidFill>
-              </a:rPr>
-              <a:t>Missing: to be started</a:t>
             </a:r>
           </a:p>
         </p:txBody>

</xml_diff>